<commit_message>
revise PS_equivalence_same_property, edit digraphs re def:partition
</commit_message>
<xml_diff>
--- a/fall11/slidesF11/slides7f.pptx
+++ b/fall11/slidesF11/slides7f.pptx
@@ -4457,8 +4457,8 @@
         </p:nvSpPr>
         <p:spPr>
           <a:xfrm>
-            <a:off x="8077200" y="6553200"/>
-            <a:ext cx="1143000" cy="304800"/>
+            <a:off x="8229600" y="6553200"/>
+            <a:ext cx="914400" cy="304800"/>
           </a:xfrm>
           <a:prstGeom prst="rect">
             <a:avLst/>
@@ -4506,7 +4506,7 @@
                 <a:ea typeface="+mn-ea"/>
                 <a:cs typeface="+mn-cs"/>
               </a:rPr>
-              <a:t>lec7M.</a:t>
+              <a:t>lec7F.</a:t>
             </a:r>
             <a:fld id="{CA4C0C47-BA92-4669-BC5C-D64A96AF3D01}" type="slidenum">
               <a:rPr kumimoji="0" lang="en-US" sz="1200" b="0" i="0" u="none" strike="noStrike" kern="1200" cap="none" spc="0" normalizeH="0" baseline="0" noProof="0" smtClean="0">
@@ -4595,8 +4595,8 @@
         </p:nvSpPr>
         <p:spPr>
           <a:xfrm>
-            <a:off x="3098800" y="6477000"/>
-            <a:ext cx="2844800" cy="304800"/>
+            <a:off x="3048000" y="6477000"/>
+            <a:ext cx="2921000" cy="304800"/>
           </a:xfrm>
           <a:prstGeom prst="rect">
             <a:avLst/>
@@ -4636,7 +4636,37 @@
                 <a:uFillTx/>
                 <a:latin typeface="Comic Sans MS" pitchFamily="66" charset="0"/>
               </a:rPr>
-              <a:t>Albert R Meyer         March 14, 2011</a:t>
+              <a:t>Albert R Meyer         </a:t>
+            </a:r>
+            <a:r>
+              <a:rPr kumimoji="0" lang="en-US" sz="1200" b="0" i="0" u="none" strike="noStrike" kern="1200" cap="none" spc="0" normalizeH="0" baseline="0" noProof="0" dirty="0" smtClean="0">
+                <a:ln>
+                  <a:noFill/>
+                </a:ln>
+                <a:solidFill>
+                  <a:schemeClr val="tx1"/>
+                </a:solidFill>
+                <a:effectLst/>
+                <a:uLnTx/>
+                <a:uFillTx/>
+                <a:latin typeface="Comic Sans MS" pitchFamily="66" charset="0"/>
+              </a:rPr>
+              <a:t>October 21, </a:t>
+            </a:r>
+            <a:r>
+              <a:rPr kumimoji="0" lang="en-US" sz="1200" b="0" i="0" u="none" strike="noStrike" kern="1200" cap="none" spc="0" normalizeH="0" baseline="0" noProof="0" dirty="0" smtClean="0">
+                <a:ln>
+                  <a:noFill/>
+                </a:ln>
+                <a:solidFill>
+                  <a:schemeClr val="tx1"/>
+                </a:solidFill>
+                <a:effectLst/>
+                <a:uLnTx/>
+                <a:uFillTx/>
+                <a:latin typeface="Comic Sans MS" pitchFamily="66" charset="0"/>
+              </a:rPr>
+              <a:t>2011</a:t>
             </a:r>
             <a:endParaRPr kumimoji="0" lang="en-US" sz="1200" b="0" i="0" u="none" strike="noStrike" kern="1200" cap="none" spc="0" normalizeH="0" baseline="0" noProof="0" dirty="0">
               <a:ln>
@@ -5068,8 +5098,8 @@
         </p:nvSpPr>
         <p:spPr bwMode="auto">
           <a:xfrm>
-            <a:off x="152400" y="2133600"/>
-            <a:ext cx="8915400" cy="2514600"/>
+            <a:off x="304800" y="1447800"/>
+            <a:ext cx="8382000" cy="3962400"/>
           </a:xfrm>
           <a:prstGeom prst="rect">
             <a:avLst/>
@@ -5093,18 +5123,43 @@
               </a:spcBef>
             </a:pPr>
             <a:r>
-              <a:rPr lang="en-US" sz="8800" b="1" dirty="0">
+              <a:rPr lang="en-US" sz="8000" b="1" dirty="0">
                 <a:latin typeface="Comic Sans MS" pitchFamily="66" charset="0"/>
               </a:rPr>
               <a:t>Partial </a:t>
             </a:r>
             <a:r>
-              <a:rPr lang="en-US" sz="8800" b="1" dirty="0" smtClean="0">
-                <a:latin typeface="Comic Sans MS" pitchFamily="66" charset="0"/>
-              </a:rPr>
-              <a:t>Orders</a:t>
-            </a:r>
-            <a:endParaRPr lang="en-US" sz="8800" b="1" dirty="0">
+              <a:rPr lang="en-US" sz="8000" b="1" dirty="0" smtClean="0">
+                <a:latin typeface="Comic Sans MS" pitchFamily="66" charset="0"/>
+              </a:rPr>
+              <a:t>Orders </a:t>
+            </a:r>
+            <a:r>
+              <a:rPr lang="en-US" sz="7200" b="1" dirty="0" smtClean="0">
+                <a:latin typeface="Comic Sans MS" pitchFamily="66" charset="0"/>
+              </a:rPr>
+              <a:t>&amp;</a:t>
+            </a:r>
+            <a:r>
+              <a:rPr lang="en-US" sz="8000" b="1" dirty="0" smtClean="0">
+                <a:latin typeface="Comic Sans MS" pitchFamily="66" charset="0"/>
+              </a:rPr>
+              <a:t> Equivalence</a:t>
+            </a:r>
+          </a:p>
+          <a:p>
+            <a:pPr algn="ctr">
+              <a:spcBef>
+                <a:spcPct val="0"/>
+              </a:spcBef>
+            </a:pPr>
+            <a:r>
+              <a:rPr lang="en-US" sz="8000" b="1" dirty="0" smtClean="0">
+                <a:latin typeface="Comic Sans MS" pitchFamily="66" charset="0"/>
+              </a:rPr>
+              <a:t>Relations</a:t>
+            </a:r>
+            <a:endParaRPr lang="en-US" sz="8000" b="1" dirty="0">
               <a:latin typeface="Comic Sans MS" pitchFamily="66" charset="0"/>
             </a:endParaRPr>
           </a:p>
@@ -14280,7 +14335,7 @@
           <a:graphicData uri="http://schemas.openxmlformats.org/presentationml/2006/ole">
             <mc:AlternateContent xmlns:mc="http://schemas.openxmlformats.org/markup-compatibility/2006">
               <mc:Choice xmlns:v="urn:schemas-microsoft-com:vml" Requires="v">
-                <p:oleObj spid="_x0000_s120836" name="Equation" r:id="rId3" imgW="1879600" imgH="482600" progId="Equation.DSMT4">
+                <p:oleObj spid="_x0000_s120839" name="Equation" r:id="rId3" imgW="1879600" imgH="482600" progId="Equation.DSMT4">
                   <p:embed/>
                 </p:oleObj>
               </mc:Choice>
@@ -20913,7 +20968,7 @@
             <a:graphicData uri="http://schemas.openxmlformats.org/presentationml/2006/ole">
               <mc:AlternateContent xmlns:mc="http://schemas.openxmlformats.org/markup-compatibility/2006">
                 <mc:Choice xmlns:v="urn:schemas-microsoft-com:vml" Requires="v">
-                  <p:oleObj spid="_x0000_s217094" name="Equation" r:id="rId3" imgW="76200" imgH="165100" progId="Equation.DSMT4">
+                  <p:oleObj spid="_x0000_s217101" name="Equation" r:id="rId3" imgW="76200" imgH="165100" progId="Equation.DSMT4">
                     <p:embed/>
                   </p:oleObj>
                 </mc:Choice>
@@ -21079,7 +21134,7 @@
             <a:graphicData uri="http://schemas.openxmlformats.org/presentationml/2006/ole">
               <mc:AlternateContent xmlns:mc="http://schemas.openxmlformats.org/markup-compatibility/2006">
                 <mc:Choice xmlns:v="urn:schemas-microsoft-com:vml" Requires="v">
-                  <p:oleObj spid="_x0000_s217095" name="Equation" r:id="rId5" imgW="76200" imgH="165100" progId="Equation.DSMT4">
+                  <p:oleObj spid="_x0000_s217102" name="Equation" r:id="rId5" imgW="76200" imgH="165100" progId="Equation.DSMT4">
                     <p:embed/>
                   </p:oleObj>
                 </mc:Choice>
@@ -21245,7 +21300,7 @@
             <a:graphicData uri="http://schemas.openxmlformats.org/presentationml/2006/ole">
               <mc:AlternateContent xmlns:mc="http://schemas.openxmlformats.org/markup-compatibility/2006">
                 <mc:Choice xmlns:v="urn:schemas-microsoft-com:vml" Requires="v">
-                  <p:oleObj spid="_x0000_s217096" name="Equation" r:id="rId7" imgW="76200" imgH="165100" progId="Equation.DSMT4">
+                  <p:oleObj spid="_x0000_s217103" name="Equation" r:id="rId7" imgW="76200" imgH="165100" progId="Equation.DSMT4">
                     <p:embed/>
                   </p:oleObj>
                 </mc:Choice>
@@ -22184,7 +22239,7 @@
           <a:graphicData uri="http://schemas.openxmlformats.org/presentationml/2006/ole">
             <mc:AlternateContent xmlns:mc="http://schemas.openxmlformats.org/markup-compatibility/2006">
               <mc:Choice xmlns:v="urn:schemas-microsoft-com:vml" Requires="v">
-                <p:oleObj spid="_x0000_s24580" name="Equation" r:id="rId4" imgW="419100" imgH="177800" progId="Equation.DSMT4">
+                <p:oleObj spid="_x0000_s24583" name="Equation" r:id="rId4" imgW="419100" imgH="177800" progId="Equation.DSMT4">
                   <p:embed/>
                 </p:oleObj>
               </mc:Choice>

</xml_diff>